<commit_message>
fix errors in presentation
</commit_message>
<xml_diff>
--- a/Lesson 1 Python.pptx
+++ b/Lesson 1 Python.pptx
@@ -285,6 +285,11 @@
       </a:defRPr>
     </a:lvl9pPr>
   </p:defaultTextStyle>
+  <p:extLst>
+    <p:ext uri="{EFAFB233-063F-42B5-8137-9DF3F51BA10A}">
+      <p15:sldGuideLst xmlns:p15="http://schemas.microsoft.com/office/powerpoint/2012/main"/>
+    </p:ext>
+  </p:extLst>
 </p:presentation>
 </file>
 
@@ -24781,7 +24786,15 @@
             <a:pPr marL="0" indent="0"/>
             <a:r>
               <a:rPr lang="el-GR" dirty="0"/>
-              <a:t>Προσοχή! 1-3 καθώς θα σταματήσει στο 4ο </a:t>
+              <a:t>Προσοχή! </a:t>
+            </a:r>
+            <a:r>
+              <a:rPr lang="en-US" dirty="0"/>
+              <a:t>0</a:t>
+            </a:r>
+            <a:r>
+              <a:rPr lang="el-GR" dirty="0"/>
+              <a:t>-3 καθώς θα σταματήσει στο 4ο </a:t>
             </a:r>
             <a:r>
               <a:rPr lang="el-GR" dirty="0" err="1"/>
@@ -24793,7 +24806,15 @@
             <a:pPr marL="0" indent="0"/>
             <a:r>
               <a:rPr lang="el-GR" dirty="0"/>
-              <a:t>αν βάζαμε 2 θα έδειχνε το 1ο και το 2ο </a:t>
+              <a:t>αν βάζαμε </a:t>
+            </a:r>
+            <a:r>
+              <a:rPr lang="en-US" dirty="0"/>
+              <a:t>3</a:t>
+            </a:r>
+            <a:r>
+              <a:rPr lang="el-GR" dirty="0"/>
+              <a:t> θα έδειχνε το 1ο και το 2ο </a:t>
             </a:r>
             <a:r>
               <a:rPr lang="el-GR" dirty="0" err="1"/>

</xml_diff>